<commit_message>
módulo 2 e 3 ppt
</commit_message>
<xml_diff>
--- a/Apresentação/Módulo 1/Modulo 1.pptx
+++ b/Apresentação/Módulo 1/Modulo 1.pptx
@@ -341,7 +341,7 @@
           <a:p>
             <a:fld id="{05D07FE6-D4F0-43B8-8724-69D32D78BC5B}" type="datetimeFigureOut">
               <a:rPr lang="pt-BR" smtClean="0"/>
-              <a:t>09/04/2019</a:t>
+              <a:t>10/04/2019</a:t>
             </a:fld>
             <a:endParaRPr lang="pt-BR"/>
           </a:p>
@@ -606,7 +606,7 @@
           <a:p>
             <a:fld id="{05D07FE6-D4F0-43B8-8724-69D32D78BC5B}" type="datetimeFigureOut">
               <a:rPr lang="pt-BR" smtClean="0"/>
-              <a:t>09/04/2019</a:t>
+              <a:t>10/04/2019</a:t>
             </a:fld>
             <a:endParaRPr lang="pt-BR"/>
           </a:p>
@@ -781,7 +781,7 @@
           <a:p>
             <a:fld id="{05D07FE6-D4F0-43B8-8724-69D32D78BC5B}" type="datetimeFigureOut">
               <a:rPr lang="pt-BR" smtClean="0"/>
-              <a:t>09/04/2019</a:t>
+              <a:t>10/04/2019</a:t>
             </a:fld>
             <a:endParaRPr lang="pt-BR"/>
           </a:p>
@@ -946,7 +946,7 @@
           <a:p>
             <a:fld id="{05D07FE6-D4F0-43B8-8724-69D32D78BC5B}" type="datetimeFigureOut">
               <a:rPr lang="pt-BR" smtClean="0"/>
-              <a:t>09/04/2019</a:t>
+              <a:t>10/04/2019</a:t>
             </a:fld>
             <a:endParaRPr lang="pt-BR"/>
           </a:p>
@@ -1195,7 +1195,7 @@
           <a:p>
             <a:fld id="{05D07FE6-D4F0-43B8-8724-69D32D78BC5B}" type="datetimeFigureOut">
               <a:rPr lang="pt-BR" smtClean="0"/>
-              <a:t>09/04/2019</a:t>
+              <a:t>10/04/2019</a:t>
             </a:fld>
             <a:endParaRPr lang="pt-BR"/>
           </a:p>
@@ -1478,7 +1478,7 @@
           <a:p>
             <a:fld id="{05D07FE6-D4F0-43B8-8724-69D32D78BC5B}" type="datetimeFigureOut">
               <a:rPr lang="pt-BR" smtClean="0"/>
-              <a:t>09/04/2019</a:t>
+              <a:t>10/04/2019</a:t>
             </a:fld>
             <a:endParaRPr lang="pt-BR"/>
           </a:p>
@@ -1917,7 +1917,7 @@
           <a:p>
             <a:fld id="{05D07FE6-D4F0-43B8-8724-69D32D78BC5B}" type="datetimeFigureOut">
               <a:rPr lang="pt-BR" smtClean="0"/>
-              <a:t>09/04/2019</a:t>
+              <a:t>10/04/2019</a:t>
             </a:fld>
             <a:endParaRPr lang="pt-BR"/>
           </a:p>
@@ -2030,7 +2030,7 @@
           <a:p>
             <a:fld id="{05D07FE6-D4F0-43B8-8724-69D32D78BC5B}" type="datetimeFigureOut">
               <a:rPr lang="pt-BR" smtClean="0"/>
-              <a:t>09/04/2019</a:t>
+              <a:t>10/04/2019</a:t>
             </a:fld>
             <a:endParaRPr lang="pt-BR"/>
           </a:p>
@@ -2120,7 +2120,7 @@
           <a:p>
             <a:fld id="{05D07FE6-D4F0-43B8-8724-69D32D78BC5B}" type="datetimeFigureOut">
               <a:rPr lang="pt-BR" smtClean="0"/>
-              <a:t>09/04/2019</a:t>
+              <a:t>10/04/2019</a:t>
             </a:fld>
             <a:endParaRPr lang="pt-BR"/>
           </a:p>
@@ -2362,7 +2362,7 @@
           <a:p>
             <a:fld id="{05D07FE6-D4F0-43B8-8724-69D32D78BC5B}" type="datetimeFigureOut">
               <a:rPr lang="pt-BR" smtClean="0"/>
-              <a:t>09/04/2019</a:t>
+              <a:t>10/04/2019</a:t>
             </a:fld>
             <a:endParaRPr lang="pt-BR"/>
           </a:p>
@@ -2656,7 +2656,7 @@
           <a:p>
             <a:fld id="{05D07FE6-D4F0-43B8-8724-69D32D78BC5B}" type="datetimeFigureOut">
               <a:rPr lang="pt-BR" smtClean="0"/>
-              <a:t>09/04/2019</a:t>
+              <a:t>10/04/2019</a:t>
             </a:fld>
             <a:endParaRPr lang="pt-BR"/>
           </a:p>
@@ -2950,7 +2950,7 @@
           <a:p>
             <a:fld id="{05D07FE6-D4F0-43B8-8724-69D32D78BC5B}" type="datetimeFigureOut">
               <a:rPr lang="pt-BR" smtClean="0"/>
-              <a:t>09/04/2019</a:t>
+              <a:t>10/04/2019</a:t>
             </a:fld>
             <a:endParaRPr lang="pt-BR"/>
           </a:p>
@@ -7663,27 +7663,29 @@
       </p:cxnSp>
       <p:pic>
         <p:nvPicPr>
-          <p:cNvPr id="6" name="Picture 7" descr="Angular-Logo-PNG-Image.png"/>
+          <p:cNvPr id="1026" name="Picture 2" descr="C:\Users\User\Desktop\Workshop\angular-project\Apresentação\Imagens\images.png"/>
           <p:cNvPicPr>
             <a:picLocks noChangeAspect="1" noChangeArrowheads="1"/>
           </p:cNvPicPr>
           <p:nvPr/>
         </p:nvPicPr>
-        <p:blipFill rotWithShape="1">
-          <a:blip r:embed="rId2" cstate="print">
+        <p:blipFill>
+          <a:blip r:embed="rId2">
             <a:extLst>
               <a:ext uri="{28A0092B-C50C-407E-A947-70E740481C1C}">
                 <a14:useLocalDpi xmlns:a14="http://schemas.microsoft.com/office/drawing/2010/main" val="0"/>
               </a:ext>
             </a:extLst>
           </a:blip>
-          <a:srcRect l="2299" t="36731" r="73370" b="36781"/>
-          <a:stretch/>
+          <a:srcRect/>
+          <a:stretch>
+            <a:fillRect/>
+          </a:stretch>
         </p:blipFill>
         <p:spPr bwMode="auto">
           <a:xfrm>
-            <a:off x="7156265" y="160338"/>
-            <a:ext cx="1317026" cy="1433826"/>
+            <a:off x="6804248" y="140152"/>
+            <a:ext cx="2088231" cy="1478186"/>
           </a:xfrm>
           <a:prstGeom prst="rect">
             <a:avLst/>
@@ -7853,27 +7855,50 @@
       </p:cxnSp>
       <p:pic>
         <p:nvPicPr>
-          <p:cNvPr id="6" name="Picture 7" descr="Angular-Logo-PNG-Image.png"/>
+          <p:cNvPr id="7" name="Imagem 6"/>
+          <p:cNvPicPr/>
+          <p:nvPr/>
+        </p:nvPicPr>
+        <p:blipFill rotWithShape="1">
+          <a:blip r:embed="rId2"/>
+          <a:srcRect t="11134" r="3262"/>
+          <a:stretch/>
+        </p:blipFill>
+        <p:spPr>
+          <a:xfrm>
+            <a:off x="179512" y="2108579"/>
+            <a:ext cx="8712968" cy="3932688"/>
+          </a:xfrm>
+          <a:prstGeom prst="rect">
+            <a:avLst/>
+          </a:prstGeom>
+        </p:spPr>
+      </p:pic>
+      <p:pic>
+        <p:nvPicPr>
+          <p:cNvPr id="8" name="Picture 2" descr="C:\Users\User\Desktop\Workshop\angular-project\Apresentação\Imagens\images.png"/>
           <p:cNvPicPr>
             <a:picLocks noChangeAspect="1" noChangeArrowheads="1"/>
           </p:cNvPicPr>
           <p:nvPr/>
         </p:nvPicPr>
-        <p:blipFill rotWithShape="1">
-          <a:blip r:embed="rId2" cstate="print">
+        <p:blipFill>
+          <a:blip r:embed="rId3">
             <a:extLst>
               <a:ext uri="{28A0092B-C50C-407E-A947-70E740481C1C}">
                 <a14:useLocalDpi xmlns:a14="http://schemas.microsoft.com/office/drawing/2010/main" val="0"/>
               </a:ext>
             </a:extLst>
           </a:blip>
-          <a:srcRect l="2299" t="36731" r="73370" b="36781"/>
-          <a:stretch/>
+          <a:srcRect/>
+          <a:stretch>
+            <a:fillRect/>
+          </a:stretch>
         </p:blipFill>
         <p:spPr bwMode="auto">
           <a:xfrm>
-            <a:off x="7156265" y="160338"/>
-            <a:ext cx="1317026" cy="1433826"/>
+            <a:off x="6804248" y="140152"/>
+            <a:ext cx="2088231" cy="1478186"/>
           </a:xfrm>
           <a:prstGeom prst="rect">
             <a:avLst/>
@@ -7888,27 +7913,6 @@
               </a14:hiddenFill>
             </a:ext>
           </a:extLst>
-        </p:spPr>
-      </p:pic>
-      <p:pic>
-        <p:nvPicPr>
-          <p:cNvPr id="7" name="Imagem 6"/>
-          <p:cNvPicPr/>
-          <p:nvPr/>
-        </p:nvPicPr>
-        <p:blipFill rotWithShape="1">
-          <a:blip r:embed="rId3"/>
-          <a:srcRect t="11134" r="3262"/>
-          <a:stretch/>
-        </p:blipFill>
-        <p:spPr>
-          <a:xfrm>
-            <a:off x="179512" y="2108579"/>
-            <a:ext cx="8712968" cy="3932688"/>
-          </a:xfrm>
-          <a:prstGeom prst="rect">
-            <a:avLst/>
-          </a:prstGeom>
         </p:spPr>
       </p:pic>
     </p:spTree>
@@ -8064,27 +8068,121 @@
       </p:cxnSp>
       <p:pic>
         <p:nvPicPr>
-          <p:cNvPr id="6" name="Picture 7" descr="Angular-Logo-PNG-Image.png"/>
+          <p:cNvPr id="8" name="Imagem 7"/>
+          <p:cNvPicPr/>
+          <p:nvPr/>
+        </p:nvPicPr>
+        <p:blipFill rotWithShape="1">
+          <a:blip r:embed="rId2"/>
+          <a:srcRect t="5248" r="2144"/>
+          <a:stretch/>
+        </p:blipFill>
+        <p:spPr>
+          <a:xfrm>
+            <a:off x="390462" y="1778452"/>
+            <a:ext cx="8496930" cy="4314844"/>
+          </a:xfrm>
+          <a:prstGeom prst="rect">
+            <a:avLst/>
+          </a:prstGeom>
+        </p:spPr>
+      </p:pic>
+      <p:sp>
+        <p:nvSpPr>
+          <p:cNvPr id="4" name="CaixaDeTexto 3"/>
+          <p:cNvSpPr txBox="1"/>
+          <p:nvPr/>
+        </p:nvSpPr>
+        <p:spPr>
+          <a:xfrm>
+            <a:off x="395536" y="1844824"/>
+            <a:ext cx="8491856" cy="1169551"/>
+          </a:xfrm>
+          <a:prstGeom prst="rect">
+            <a:avLst/>
+          </a:prstGeom>
+          <a:noFill/>
+        </p:spPr>
+        <p:txBody>
+          <a:bodyPr wrap="square" rtlCol="0">
+            <a:spAutoFit/>
+          </a:bodyPr>
+          <a:lstStyle/>
+          <a:p>
+            <a:pPr algn="just"/>
+            <a:r>
+              <a:rPr lang="pt-BR" sz="2600" dirty="0" smtClean="0">
+                <a:latin typeface="Times New Roman" pitchFamily="18" charset="0"/>
+                <a:cs typeface="Times New Roman" pitchFamily="18" charset="0"/>
+              </a:rPr>
+              <a:t>Confirmar </a:t>
+            </a:r>
+            <a:r>
+              <a:rPr lang="pt-BR" sz="2600" dirty="0">
+                <a:latin typeface="Times New Roman" pitchFamily="18" charset="0"/>
+                <a:cs typeface="Times New Roman" pitchFamily="18" charset="0"/>
+              </a:rPr>
+              <a:t>se o angular está sendo reconhecido através do comando </a:t>
+            </a:r>
+            <a:r>
+              <a:rPr lang="pt-BR" sz="2600" dirty="0" err="1">
+                <a:latin typeface="Times New Roman" pitchFamily="18" charset="0"/>
+                <a:cs typeface="Times New Roman" pitchFamily="18" charset="0"/>
+              </a:rPr>
+              <a:t>ng</a:t>
+            </a:r>
+            <a:r>
+              <a:rPr lang="pt-BR" sz="2600" dirty="0">
+                <a:latin typeface="Times New Roman" pitchFamily="18" charset="0"/>
+                <a:cs typeface="Times New Roman" pitchFamily="18" charset="0"/>
+              </a:rPr>
+              <a:t> </a:t>
+            </a:r>
+            <a:r>
+              <a:rPr lang="pt-BR" sz="2600" dirty="0" err="1">
+                <a:latin typeface="Times New Roman" pitchFamily="18" charset="0"/>
+                <a:cs typeface="Times New Roman" pitchFamily="18" charset="0"/>
+              </a:rPr>
+              <a:t>version</a:t>
+            </a:r>
+            <a:r>
+              <a:rPr lang="pt-BR" sz="2600" dirty="0">
+                <a:latin typeface="Times New Roman" pitchFamily="18" charset="0"/>
+                <a:cs typeface="Times New Roman" pitchFamily="18" charset="0"/>
+              </a:rPr>
+              <a:t>:</a:t>
+            </a:r>
+          </a:p>
+          <a:p>
+            <a:endParaRPr lang="pt-BR" dirty="0"/>
+          </a:p>
+        </p:txBody>
+      </p:sp>
+      <p:pic>
+        <p:nvPicPr>
+          <p:cNvPr id="9" name="Picture 2" descr="C:\Users\User\Desktop\Workshop\angular-project\Apresentação\Imagens\images.png"/>
           <p:cNvPicPr>
             <a:picLocks noChangeAspect="1" noChangeArrowheads="1"/>
           </p:cNvPicPr>
           <p:nvPr/>
         </p:nvPicPr>
-        <p:blipFill rotWithShape="1">
-          <a:blip r:embed="rId2" cstate="print">
+        <p:blipFill>
+          <a:blip r:embed="rId3">
             <a:extLst>
               <a:ext uri="{28A0092B-C50C-407E-A947-70E740481C1C}">
                 <a14:useLocalDpi xmlns:a14="http://schemas.microsoft.com/office/drawing/2010/main" val="0"/>
               </a:ext>
             </a:extLst>
           </a:blip>
-          <a:srcRect l="2299" t="36731" r="73370" b="36781"/>
-          <a:stretch/>
+          <a:srcRect/>
+          <a:stretch>
+            <a:fillRect/>
+          </a:stretch>
         </p:blipFill>
         <p:spPr bwMode="auto">
           <a:xfrm>
-            <a:off x="7156265" y="160338"/>
-            <a:ext cx="1317026" cy="1433826"/>
+            <a:off x="6804248" y="140152"/>
+            <a:ext cx="2088231" cy="1478186"/>
           </a:xfrm>
           <a:prstGeom prst="rect">
             <a:avLst/>
@@ -8101,98 +8199,6 @@
           </a:extLst>
         </p:spPr>
       </p:pic>
-      <p:pic>
-        <p:nvPicPr>
-          <p:cNvPr id="8" name="Imagem 7"/>
-          <p:cNvPicPr/>
-          <p:nvPr/>
-        </p:nvPicPr>
-        <p:blipFill rotWithShape="1">
-          <a:blip r:embed="rId3"/>
-          <a:srcRect t="5248" r="2144"/>
-          <a:stretch/>
-        </p:blipFill>
-        <p:spPr>
-          <a:xfrm>
-            <a:off x="390462" y="1778452"/>
-            <a:ext cx="8496930" cy="4314844"/>
-          </a:xfrm>
-          <a:prstGeom prst="rect">
-            <a:avLst/>
-          </a:prstGeom>
-        </p:spPr>
-      </p:pic>
-      <p:sp>
-        <p:nvSpPr>
-          <p:cNvPr id="4" name="CaixaDeTexto 3"/>
-          <p:cNvSpPr txBox="1"/>
-          <p:nvPr/>
-        </p:nvSpPr>
-        <p:spPr>
-          <a:xfrm>
-            <a:off x="395536" y="1844824"/>
-            <a:ext cx="8491856" cy="1169551"/>
-          </a:xfrm>
-          <a:prstGeom prst="rect">
-            <a:avLst/>
-          </a:prstGeom>
-          <a:noFill/>
-        </p:spPr>
-        <p:txBody>
-          <a:bodyPr wrap="square" rtlCol="0">
-            <a:spAutoFit/>
-          </a:bodyPr>
-          <a:lstStyle/>
-          <a:p>
-            <a:pPr algn="just"/>
-            <a:r>
-              <a:rPr lang="pt-BR" sz="2600" dirty="0" smtClean="0">
-                <a:latin typeface="Times New Roman" pitchFamily="18" charset="0"/>
-                <a:cs typeface="Times New Roman" pitchFamily="18" charset="0"/>
-              </a:rPr>
-              <a:t>Confirmar </a:t>
-            </a:r>
-            <a:r>
-              <a:rPr lang="pt-BR" sz="2600" dirty="0">
-                <a:latin typeface="Times New Roman" pitchFamily="18" charset="0"/>
-                <a:cs typeface="Times New Roman" pitchFamily="18" charset="0"/>
-              </a:rPr>
-              <a:t>se o angular está sendo reconhecido através do comando </a:t>
-            </a:r>
-            <a:r>
-              <a:rPr lang="pt-BR" sz="2600" dirty="0" err="1">
-                <a:latin typeface="Times New Roman" pitchFamily="18" charset="0"/>
-                <a:cs typeface="Times New Roman" pitchFamily="18" charset="0"/>
-              </a:rPr>
-              <a:t>ng</a:t>
-            </a:r>
-            <a:r>
-              <a:rPr lang="pt-BR" sz="2600" dirty="0">
-                <a:latin typeface="Times New Roman" pitchFamily="18" charset="0"/>
-                <a:cs typeface="Times New Roman" pitchFamily="18" charset="0"/>
-              </a:rPr>
-              <a:t> </a:t>
-            </a:r>
-            <a:r>
-              <a:rPr lang="pt-BR" sz="2600" dirty="0" err="1">
-                <a:latin typeface="Times New Roman" pitchFamily="18" charset="0"/>
-                <a:cs typeface="Times New Roman" pitchFamily="18" charset="0"/>
-              </a:rPr>
-              <a:t>version</a:t>
-            </a:r>
-            <a:r>
-              <a:rPr lang="pt-BR" sz="2600" dirty="0">
-                <a:latin typeface="Times New Roman" pitchFamily="18" charset="0"/>
-                <a:cs typeface="Times New Roman" pitchFamily="18" charset="0"/>
-              </a:rPr>
-              <a:t>:</a:t>
-            </a:r>
-          </a:p>
-          <a:p>
-            <a:endParaRPr lang="pt-BR" dirty="0"/>
-          </a:p>
-        </p:txBody>
-      </p:sp>
     </p:spTree>
     <p:extLst>
       <p:ext uri="{BB962C8B-B14F-4D97-AF65-F5344CB8AC3E}">
@@ -9095,12 +9101,8 @@
           <a:lstStyle/>
           <a:p>
             <a:r>
-              <a:rPr lang="pt-BR" sz="2700" dirty="0" err="1" smtClean="0"/>
-              <a:t>Módules</a:t>
-            </a:r>
-            <a:r>
-              <a:rPr lang="pt-BR" sz="2700" dirty="0" smtClean="0"/>
-              <a:t> </a:t>
+              <a:rPr lang="pt-BR" sz="2700" smtClean="0"/>
+              <a:t>Modules </a:t>
             </a:r>
             <a:endParaRPr lang="pt-BR" sz="2700" dirty="0"/>
           </a:p>
@@ -9347,12 +9349,8 @@
           <a:lstStyle/>
           <a:p>
             <a:r>
-              <a:rPr lang="pt-BR" sz="2700" dirty="0" err="1" smtClean="0"/>
-              <a:t>Módules</a:t>
-            </a:r>
-            <a:r>
               <a:rPr lang="pt-BR" sz="2700" dirty="0" smtClean="0"/>
-              <a:t> - @</a:t>
+              <a:t>Modules - @</a:t>
             </a:r>
             <a:r>
               <a:rPr lang="pt-BR" sz="2700" cap="none" dirty="0" err="1" smtClean="0"/>
@@ -12069,8 +12067,21 @@
                   <a:srgbClr val="FF0000"/>
                 </a:solidFill>
               </a:rPr>
-              <a:t>Criar novo modulo</a:t>
-            </a:r>
+              <a:t>Criar novo </a:t>
+            </a:r>
+            <a:r>
+              <a:rPr lang="pt-BR" dirty="0" smtClean="0">
+                <a:solidFill>
+                  <a:srgbClr val="FF0000"/>
+                </a:solidFill>
+              </a:rPr>
+              <a:t>módulo</a:t>
+            </a:r>
+            <a:endParaRPr lang="pt-BR" dirty="0">
+              <a:solidFill>
+                <a:srgbClr val="FF0000"/>
+              </a:solidFill>
+            </a:endParaRPr>
           </a:p>
           <a:p>
             <a:r>
@@ -12110,8 +12121,21 @@
                   <a:srgbClr val="FF0000"/>
                 </a:solidFill>
               </a:rPr>
-              <a:t>Criar novos componentes do modulo</a:t>
-            </a:r>
+              <a:t>Criar novos componentes do </a:t>
+            </a:r>
+            <a:r>
+              <a:rPr lang="pt-BR" dirty="0" smtClean="0">
+                <a:solidFill>
+                  <a:srgbClr val="FF0000"/>
+                </a:solidFill>
+              </a:rPr>
+              <a:t>módulo</a:t>
+            </a:r>
+            <a:endParaRPr lang="pt-BR" dirty="0">
+              <a:solidFill>
+                <a:srgbClr val="FF0000"/>
+              </a:solidFill>
+            </a:endParaRPr>
           </a:p>
           <a:p>
             <a:r>
@@ -12198,7 +12222,7 @@
                   <a:srgbClr val="FF0000"/>
                 </a:solidFill>
               </a:rPr>
-              <a:t>Criar novos serviço dos componentes</a:t>
+              <a:t>Criar novos serviços dos componentes</a:t>
             </a:r>
           </a:p>
           <a:p>
@@ -13744,7 +13768,7 @@
           <a:p>
             <a:r>
               <a:rPr lang="pt-BR" sz="2700" dirty="0" smtClean="0"/>
-              <a:t>Exercício</a:t>
+              <a:t>Exercícios</a:t>
             </a:r>
             <a:endParaRPr lang="pt-BR" sz="2700" dirty="0"/>
           </a:p>

</xml_diff>